<commit_message>
adding more overview and example text
</commit_message>
<xml_diff>
--- a/diagrams.pptx
+++ b/diagrams.pptx
@@ -3323,10 +3323,10 @@
       </p:grpSpPr>
       <p:grpSp>
         <p:nvGrpSpPr>
-          <p:cNvPr id="19" name="Group 18">
-            <a:extLst>
-              <a:ext uri="{FF2B5EF4-FFF2-40B4-BE49-F238E27FC236}">
-                <a16:creationId xmlns:a16="http://schemas.microsoft.com/office/drawing/2014/main" id="{FE856A45-4D06-5B47-A5D9-589DD5755CE8}"/>
+          <p:cNvPr id="31" name="Group 30">
+            <a:extLst>
+              <a:ext uri="{FF2B5EF4-FFF2-40B4-BE49-F238E27FC236}">
+                <a16:creationId xmlns:a16="http://schemas.microsoft.com/office/drawing/2014/main" id="{0A37CDE8-75DE-A546-82E6-A2FA2E028B48}"/>
               </a:ext>
             </a:extLst>
           </p:cNvPr>
@@ -3336,17 +3336,357 @@
         <p:grpSpPr>
           <a:xfrm>
             <a:off x="2986238" y="2354980"/>
-            <a:ext cx="4952200" cy="1981200"/>
+            <a:ext cx="4983483" cy="4145278"/>
             <a:chOff x="2986238" y="2354980"/>
-            <a:chExt cx="4952200" cy="1981200"/>
+            <a:chExt cx="4983483" cy="4145278"/>
           </a:xfrm>
         </p:grpSpPr>
+        <p:grpSp>
+          <p:nvGrpSpPr>
+            <p:cNvPr id="19" name="Group 18">
+              <a:extLst>
+                <a:ext uri="{FF2B5EF4-FFF2-40B4-BE49-F238E27FC236}">
+                  <a16:creationId xmlns:a16="http://schemas.microsoft.com/office/drawing/2014/main" id="{FE856A45-4D06-5B47-A5D9-589DD5755CE8}"/>
+                </a:ext>
+              </a:extLst>
+            </p:cNvPr>
+            <p:cNvGrpSpPr/>
+            <p:nvPr/>
+          </p:nvGrpSpPr>
+          <p:grpSpPr>
+            <a:xfrm>
+              <a:off x="2986238" y="2354980"/>
+              <a:ext cx="4952200" cy="1981200"/>
+              <a:chOff x="2986238" y="2354980"/>
+              <a:chExt cx="4952200" cy="1981200"/>
+            </a:xfrm>
+          </p:grpSpPr>
+          <p:sp>
+            <p:nvSpPr>
+              <p:cNvPr id="8" name="Rounded Rectangle 7">
+                <a:extLst>
+                  <a:ext uri="{FF2B5EF4-FFF2-40B4-BE49-F238E27FC236}">
+                    <a16:creationId xmlns:a16="http://schemas.microsoft.com/office/drawing/2014/main" id="{303E555D-16D9-0145-9749-48F89F979DD7}"/>
+                  </a:ext>
+                </a:extLst>
+              </p:cNvPr>
+              <p:cNvSpPr/>
+              <p:nvPr/>
+            </p:nvSpPr>
+            <p:spPr>
+              <a:xfrm>
+                <a:off x="4657826" y="2354980"/>
+                <a:ext cx="1609024" cy="808522"/>
+              </a:xfrm>
+              <a:prstGeom prst="roundRect">
+                <a:avLst/>
+              </a:prstGeom>
+            </p:spPr>
+            <p:style>
+              <a:lnRef idx="2">
+                <a:schemeClr val="accent1">
+                  <a:shade val="50000"/>
+                </a:schemeClr>
+              </a:lnRef>
+              <a:fillRef idx="1">
+                <a:schemeClr val="accent1"/>
+              </a:fillRef>
+              <a:effectRef idx="0">
+                <a:schemeClr val="accent1"/>
+              </a:effectRef>
+              <a:fontRef idx="minor">
+                <a:schemeClr val="lt1"/>
+              </a:fontRef>
+            </p:style>
+            <p:txBody>
+              <a:bodyPr rtlCol="0" anchor="ctr"/>
+              <a:lstStyle/>
+              <a:p>
+                <a:pPr algn="ctr"/>
+                <a:r>
+                  <a:rPr lang="en-US" sz="2000" dirty="0"/>
+                  <a:t>Trigger</a:t>
+                </a:r>
+              </a:p>
+            </p:txBody>
+          </p:sp>
+          <p:sp>
+            <p:nvSpPr>
+              <p:cNvPr id="9" name="Rounded Rectangle 8">
+                <a:extLst>
+                  <a:ext uri="{FF2B5EF4-FFF2-40B4-BE49-F238E27FC236}">
+                    <a16:creationId xmlns:a16="http://schemas.microsoft.com/office/drawing/2014/main" id="{865EE865-2018-CF41-9DDF-19791708C9B2}"/>
+                  </a:ext>
+                </a:extLst>
+              </p:cNvPr>
+              <p:cNvSpPr/>
+              <p:nvPr/>
+            </p:nvSpPr>
+            <p:spPr>
+              <a:xfrm>
+                <a:off x="2986238" y="3527658"/>
+                <a:ext cx="1609024" cy="808522"/>
+              </a:xfrm>
+              <a:prstGeom prst="roundRect">
+                <a:avLst/>
+              </a:prstGeom>
+            </p:spPr>
+            <p:style>
+              <a:lnRef idx="2">
+                <a:schemeClr val="accent1">
+                  <a:shade val="50000"/>
+                </a:schemeClr>
+              </a:lnRef>
+              <a:fillRef idx="1">
+                <a:schemeClr val="accent1"/>
+              </a:fillRef>
+              <a:effectRef idx="0">
+                <a:schemeClr val="accent1"/>
+              </a:effectRef>
+              <a:fontRef idx="minor">
+                <a:schemeClr val="lt1"/>
+              </a:fontRef>
+            </p:style>
+            <p:txBody>
+              <a:bodyPr rtlCol="0" anchor="ctr"/>
+              <a:lstStyle/>
+              <a:p>
+                <a:pPr algn="ctr"/>
+                <a:r>
+                  <a:rPr lang="en-US" sz="2000" dirty="0"/>
+                  <a:t>Field</a:t>
+                </a:r>
+              </a:p>
+            </p:txBody>
+          </p:sp>
+          <p:sp>
+            <p:nvSpPr>
+              <p:cNvPr id="10" name="Rounded Rectangle 9">
+                <a:extLst>
+                  <a:ext uri="{FF2B5EF4-FFF2-40B4-BE49-F238E27FC236}">
+                    <a16:creationId xmlns:a16="http://schemas.microsoft.com/office/drawing/2014/main" id="{2322721E-017F-D945-BF38-1530668DC2D5}"/>
+                  </a:ext>
+                </a:extLst>
+              </p:cNvPr>
+              <p:cNvSpPr/>
+              <p:nvPr/>
+            </p:nvSpPr>
+            <p:spPr>
+              <a:xfrm>
+                <a:off x="4657826" y="3527658"/>
+                <a:ext cx="1609024" cy="808522"/>
+              </a:xfrm>
+              <a:prstGeom prst="roundRect">
+                <a:avLst/>
+              </a:prstGeom>
+            </p:spPr>
+            <p:style>
+              <a:lnRef idx="2">
+                <a:schemeClr val="accent1">
+                  <a:shade val="50000"/>
+                </a:schemeClr>
+              </a:lnRef>
+              <a:fillRef idx="1">
+                <a:schemeClr val="accent1"/>
+              </a:fillRef>
+              <a:effectRef idx="0">
+                <a:schemeClr val="accent1"/>
+              </a:effectRef>
+              <a:fontRef idx="minor">
+                <a:schemeClr val="lt1"/>
+              </a:fontRef>
+            </p:style>
+            <p:txBody>
+              <a:bodyPr rtlCol="0" anchor="ctr"/>
+              <a:lstStyle/>
+              <a:p>
+                <a:pPr algn="ctr"/>
+                <a:r>
+                  <a:rPr lang="en-US" sz="2000" dirty="0"/>
+                  <a:t>Mesh</a:t>
+                </a:r>
+              </a:p>
+            </p:txBody>
+          </p:sp>
+          <p:sp>
+            <p:nvSpPr>
+              <p:cNvPr id="11" name="Rounded Rectangle 10">
+                <a:extLst>
+                  <a:ext uri="{FF2B5EF4-FFF2-40B4-BE49-F238E27FC236}">
+                    <a16:creationId xmlns:a16="http://schemas.microsoft.com/office/drawing/2014/main" id="{A407F82E-7288-6B42-8BB2-6FD826F8A19F}"/>
+                  </a:ext>
+                </a:extLst>
+              </p:cNvPr>
+              <p:cNvSpPr/>
+              <p:nvPr/>
+            </p:nvSpPr>
+            <p:spPr>
+              <a:xfrm>
+                <a:off x="6329414" y="3527658"/>
+                <a:ext cx="1609024" cy="808522"/>
+              </a:xfrm>
+              <a:prstGeom prst="roundRect">
+                <a:avLst/>
+              </a:prstGeom>
+            </p:spPr>
+            <p:style>
+              <a:lnRef idx="2">
+                <a:schemeClr val="accent1">
+                  <a:shade val="50000"/>
+                </a:schemeClr>
+              </a:lnRef>
+              <a:fillRef idx="1">
+                <a:schemeClr val="accent1"/>
+              </a:fillRef>
+              <a:effectRef idx="0">
+                <a:schemeClr val="accent1"/>
+              </a:effectRef>
+              <a:fontRef idx="minor">
+                <a:schemeClr val="lt1"/>
+              </a:fontRef>
+            </p:style>
+            <p:txBody>
+              <a:bodyPr rtlCol="0" anchor="ctr"/>
+              <a:lstStyle/>
+              <a:p>
+                <a:pPr algn="ctr"/>
+                <a:r>
+                  <a:rPr lang="en-US" sz="2000" dirty="0"/>
+                  <a:t>Performance</a:t>
+                </a:r>
+              </a:p>
+            </p:txBody>
+          </p:sp>
+          <p:cxnSp>
+            <p:nvCxnSpPr>
+              <p:cNvPr id="13" name="Straight Arrow Connector 12">
+                <a:extLst>
+                  <a:ext uri="{FF2B5EF4-FFF2-40B4-BE49-F238E27FC236}">
+                    <a16:creationId xmlns:a16="http://schemas.microsoft.com/office/drawing/2014/main" id="{7E0DE578-148D-7840-8685-8AB5406011CC}"/>
+                  </a:ext>
+                </a:extLst>
+              </p:cNvPr>
+              <p:cNvCxnSpPr>
+                <a:stCxn id="10" idx="0"/>
+              </p:cNvCxnSpPr>
+              <p:nvPr/>
+            </p:nvCxnSpPr>
+            <p:spPr>
+              <a:xfrm flipV="1">
+                <a:off x="5462338" y="3163502"/>
+                <a:ext cx="0" cy="364156"/>
+              </a:xfrm>
+              <a:prstGeom prst="straightConnector1">
+                <a:avLst/>
+              </a:prstGeom>
+              <a:ln w="47625" cmpd="sng">
+                <a:tailEnd type="triangle"/>
+              </a:ln>
+            </p:spPr>
+            <p:style>
+              <a:lnRef idx="1">
+                <a:schemeClr val="accent1"/>
+              </a:lnRef>
+              <a:fillRef idx="0">
+                <a:schemeClr val="accent1"/>
+              </a:fillRef>
+              <a:effectRef idx="0">
+                <a:schemeClr val="accent1"/>
+              </a:effectRef>
+              <a:fontRef idx="minor">
+                <a:schemeClr val="tx1"/>
+              </a:fontRef>
+            </p:style>
+          </p:cxnSp>
+          <p:cxnSp>
+            <p:nvCxnSpPr>
+              <p:cNvPr id="14" name="Straight Arrow Connector 13">
+                <a:extLst>
+                  <a:ext uri="{FF2B5EF4-FFF2-40B4-BE49-F238E27FC236}">
+                    <a16:creationId xmlns:a16="http://schemas.microsoft.com/office/drawing/2014/main" id="{3F1252B8-D036-6347-B4B2-84D599B3B11A}"/>
+                  </a:ext>
+                </a:extLst>
+              </p:cNvPr>
+              <p:cNvCxnSpPr>
+                <a:cxnSpLocks/>
+              </p:cNvCxnSpPr>
+              <p:nvPr/>
+            </p:nvCxnSpPr>
+            <p:spPr>
+              <a:xfrm flipV="1">
+                <a:off x="3790750" y="3143450"/>
+                <a:ext cx="898359" cy="384209"/>
+              </a:xfrm>
+              <a:prstGeom prst="straightConnector1">
+                <a:avLst/>
+              </a:prstGeom>
+              <a:ln w="47625" cmpd="sng">
+                <a:tailEnd type="triangle"/>
+              </a:ln>
+            </p:spPr>
+            <p:style>
+              <a:lnRef idx="1">
+                <a:schemeClr val="accent1"/>
+              </a:lnRef>
+              <a:fillRef idx="0">
+                <a:schemeClr val="accent1"/>
+              </a:fillRef>
+              <a:effectRef idx="0">
+                <a:schemeClr val="accent1"/>
+              </a:effectRef>
+              <a:fontRef idx="minor">
+                <a:schemeClr val="tx1"/>
+              </a:fontRef>
+            </p:style>
+          </p:cxnSp>
+          <p:cxnSp>
+            <p:nvCxnSpPr>
+              <p:cNvPr id="16" name="Straight Arrow Connector 15">
+                <a:extLst>
+                  <a:ext uri="{FF2B5EF4-FFF2-40B4-BE49-F238E27FC236}">
+                    <a16:creationId xmlns:a16="http://schemas.microsoft.com/office/drawing/2014/main" id="{08F2CCC1-71AE-074F-A156-621B75833944}"/>
+                  </a:ext>
+                </a:extLst>
+              </p:cNvPr>
+              <p:cNvCxnSpPr>
+                <a:cxnSpLocks/>
+              </p:cNvCxnSpPr>
+              <p:nvPr/>
+            </p:nvCxnSpPr>
+            <p:spPr>
+              <a:xfrm flipH="1" flipV="1">
+                <a:off x="6235568" y="3143450"/>
+                <a:ext cx="898358" cy="384208"/>
+              </a:xfrm>
+              <a:prstGeom prst="straightConnector1">
+                <a:avLst/>
+              </a:prstGeom>
+              <a:ln w="47625" cmpd="sng">
+                <a:tailEnd type="triangle"/>
+              </a:ln>
+            </p:spPr>
+            <p:style>
+              <a:lnRef idx="1">
+                <a:schemeClr val="accent1"/>
+              </a:lnRef>
+              <a:fillRef idx="0">
+                <a:schemeClr val="accent1"/>
+              </a:fillRef>
+              <a:effectRef idx="0">
+                <a:schemeClr val="accent1"/>
+              </a:effectRef>
+              <a:fontRef idx="minor">
+                <a:schemeClr val="tx1"/>
+              </a:fontRef>
+            </p:style>
+          </p:cxnSp>
+        </p:grpSp>
         <p:sp>
           <p:nvSpPr>
-            <p:cNvPr id="8" name="Rounded Rectangle 7">
+            <p:cNvPr id="20" name="Rounded Rectangle 19">
               <a:extLst>
                 <a:ext uri="{FF2B5EF4-FFF2-40B4-BE49-F238E27FC236}">
-                  <a16:creationId xmlns:a16="http://schemas.microsoft.com/office/drawing/2014/main" id="{303E555D-16D9-0145-9749-48F89F979DD7}"/>
+                  <a16:creationId xmlns:a16="http://schemas.microsoft.com/office/drawing/2014/main" id="{FA4BDD68-EE2F-834C-821E-9A4E8C48C3CA}"/>
                 </a:ext>
               </a:extLst>
             </p:cNvPr>
@@ -3355,7 +3695,7 @@
           </p:nvSpPr>
           <p:spPr>
             <a:xfrm>
-              <a:off x="4657826" y="2354980"/>
+              <a:off x="4626544" y="5691736"/>
               <a:ext cx="1609024" cy="808522"/>
             </a:xfrm>
             <a:prstGeom prst="roundRect">
@@ -3385,17 +3725,59 @@
               <a:pPr algn="ctr"/>
               <a:r>
                 <a:rPr lang="en-US" sz="2000" dirty="0"/>
-                <a:t>Trigger</a:t>
+                <a:t>Custom</a:t>
               </a:r>
             </a:p>
           </p:txBody>
         </p:sp>
+        <p:cxnSp>
+          <p:nvCxnSpPr>
+            <p:cNvPr id="21" name="Straight Arrow Connector 20">
+              <a:extLst>
+                <a:ext uri="{FF2B5EF4-FFF2-40B4-BE49-F238E27FC236}">
+                  <a16:creationId xmlns:a16="http://schemas.microsoft.com/office/drawing/2014/main" id="{4A49A60F-56C2-E140-B4CE-29E4801D7C48}"/>
+                </a:ext>
+              </a:extLst>
+            </p:cNvPr>
+            <p:cNvCxnSpPr>
+              <a:cxnSpLocks/>
+              <a:stCxn id="20" idx="0"/>
+            </p:cNvCxnSpPr>
+            <p:nvPr/>
+          </p:nvCxnSpPr>
+          <p:spPr>
+            <a:xfrm flipV="1">
+              <a:off x="5431056" y="4336180"/>
+              <a:ext cx="0" cy="1355556"/>
+            </a:xfrm>
+            <a:prstGeom prst="straightConnector1">
+              <a:avLst/>
+            </a:prstGeom>
+            <a:ln w="47625" cmpd="sng">
+              <a:tailEnd type="triangle"/>
+            </a:ln>
+          </p:spPr>
+          <p:style>
+            <a:lnRef idx="1">
+              <a:schemeClr val="accent1"/>
+            </a:lnRef>
+            <a:fillRef idx="0">
+              <a:schemeClr val="accent1"/>
+            </a:fillRef>
+            <a:effectRef idx="0">
+              <a:schemeClr val="accent1"/>
+            </a:effectRef>
+            <a:fontRef idx="minor">
+              <a:schemeClr val="tx1"/>
+            </a:fontRef>
+          </p:style>
+        </p:cxnSp>
         <p:sp>
           <p:nvSpPr>
-            <p:cNvPr id="9" name="Rounded Rectangle 8">
+            <p:cNvPr id="23" name="Rounded Rectangle 22">
               <a:extLst>
                 <a:ext uri="{FF2B5EF4-FFF2-40B4-BE49-F238E27FC236}">
-                  <a16:creationId xmlns:a16="http://schemas.microsoft.com/office/drawing/2014/main" id="{865EE865-2018-CF41-9DDF-19791708C9B2}"/>
+                  <a16:creationId xmlns:a16="http://schemas.microsoft.com/office/drawing/2014/main" id="{953298A0-A97F-0049-B30B-ED5F6A0BB31E}"/>
                 </a:ext>
               </a:extLst>
             </p:cNvPr>
@@ -3404,7 +3786,7 @@
           </p:nvSpPr>
           <p:spPr>
             <a:xfrm>
-              <a:off x="2986238" y="3527658"/>
+              <a:off x="6360697" y="4467725"/>
               <a:ext cx="1609024" cy="808522"/>
             </a:xfrm>
             <a:prstGeom prst="roundRect">
@@ -3434,132 +3816,37 @@
               <a:pPr algn="ctr"/>
               <a:r>
                 <a:rPr lang="en-US" sz="2000" dirty="0"/>
-                <a:t>Field</a:t>
-              </a:r>
-            </a:p>
-          </p:txBody>
-        </p:sp>
-        <p:sp>
-          <p:nvSpPr>
-            <p:cNvPr id="10" name="Rounded Rectangle 9">
-              <a:extLst>
-                <a:ext uri="{FF2B5EF4-FFF2-40B4-BE49-F238E27FC236}">
-                  <a16:creationId xmlns:a16="http://schemas.microsoft.com/office/drawing/2014/main" id="{2322721E-017F-D945-BF38-1530668DC2D5}"/>
-                </a:ext>
-              </a:extLst>
-            </p:cNvPr>
-            <p:cNvSpPr/>
-            <p:nvPr/>
-          </p:nvSpPr>
-          <p:spPr>
-            <a:xfrm>
-              <a:off x="4657826" y="3527658"/>
-              <a:ext cx="1609024" cy="808522"/>
-            </a:xfrm>
-            <a:prstGeom prst="roundRect">
-              <a:avLst/>
-            </a:prstGeom>
-          </p:spPr>
-          <p:style>
-            <a:lnRef idx="2">
-              <a:schemeClr val="accent1">
-                <a:shade val="50000"/>
-              </a:schemeClr>
-            </a:lnRef>
-            <a:fillRef idx="1">
-              <a:schemeClr val="accent1"/>
-            </a:fillRef>
-            <a:effectRef idx="0">
-              <a:schemeClr val="accent1"/>
-            </a:effectRef>
-            <a:fontRef idx="minor">
-              <a:schemeClr val="lt1"/>
-            </a:fontRef>
-          </p:style>
-          <p:txBody>
-            <a:bodyPr rtlCol="0" anchor="ctr"/>
-            <a:lstStyle/>
-            <a:p>
-              <a:pPr algn="ctr"/>
-              <a:r>
-                <a:rPr lang="en-US" sz="2000" dirty="0"/>
-                <a:t>Mesh</a:t>
-              </a:r>
-            </a:p>
-          </p:txBody>
-        </p:sp>
-        <p:sp>
-          <p:nvSpPr>
-            <p:cNvPr id="11" name="Rounded Rectangle 10">
-              <a:extLst>
-                <a:ext uri="{FF2B5EF4-FFF2-40B4-BE49-F238E27FC236}">
-                  <a16:creationId xmlns:a16="http://schemas.microsoft.com/office/drawing/2014/main" id="{A407F82E-7288-6B42-8BB2-6FD826F8A19F}"/>
-                </a:ext>
-              </a:extLst>
-            </p:cNvPr>
-            <p:cNvSpPr/>
-            <p:nvPr/>
-          </p:nvSpPr>
-          <p:spPr>
-            <a:xfrm>
-              <a:off x="6329414" y="3527658"/>
-              <a:ext cx="1609024" cy="808522"/>
-            </a:xfrm>
-            <a:prstGeom prst="roundRect">
-              <a:avLst/>
-            </a:prstGeom>
-          </p:spPr>
-          <p:style>
-            <a:lnRef idx="2">
-              <a:schemeClr val="accent1">
-                <a:shade val="50000"/>
-              </a:schemeClr>
-            </a:lnRef>
-            <a:fillRef idx="1">
-              <a:schemeClr val="accent1"/>
-            </a:fillRef>
-            <a:effectRef idx="0">
-              <a:schemeClr val="accent1"/>
-            </a:effectRef>
-            <a:fontRef idx="minor">
-              <a:schemeClr val="lt1"/>
-            </a:fontRef>
-          </p:style>
-          <p:txBody>
-            <a:bodyPr rtlCol="0" anchor="ctr"/>
-            <a:lstStyle/>
-            <a:p>
-              <a:pPr algn="ctr"/>
-              <a:r>
-                <a:rPr lang="en-US" sz="2000" dirty="0"/>
-                <a:t>Performance</a:t>
+                <a:t>Stateful</a:t>
               </a:r>
             </a:p>
           </p:txBody>
         </p:sp>
         <p:cxnSp>
           <p:nvCxnSpPr>
-            <p:cNvPr id="13" name="Straight Arrow Connector 12">
+            <p:cNvPr id="26" name="Straight Arrow Connector 25">
               <a:extLst>
                 <a:ext uri="{FF2B5EF4-FFF2-40B4-BE49-F238E27FC236}">
-                  <a16:creationId xmlns:a16="http://schemas.microsoft.com/office/drawing/2014/main" id="{7E0DE578-148D-7840-8685-8AB5406011CC}"/>
+                  <a16:creationId xmlns:a16="http://schemas.microsoft.com/office/drawing/2014/main" id="{B1861613-C522-5946-B7E8-CC737BCC0549}"/>
                 </a:ext>
               </a:extLst>
             </p:cNvPr>
             <p:cNvCxnSpPr>
-              <a:stCxn id="10" idx="0"/>
+              <a:cxnSpLocks/>
+              <a:stCxn id="20" idx="0"/>
+              <a:endCxn id="23" idx="1"/>
             </p:cNvCxnSpPr>
             <p:nvPr/>
           </p:nvCxnSpPr>
           <p:spPr>
             <a:xfrm flipV="1">
-              <a:off x="5462338" y="3163502"/>
-              <a:ext cx="0" cy="364156"/>
+              <a:off x="5431056" y="4871986"/>
+              <a:ext cx="929641" cy="819750"/>
             </a:xfrm>
             <a:prstGeom prst="straightConnector1">
               <a:avLst/>
             </a:prstGeom>
             <a:ln w="47625" cmpd="sng">
+              <a:prstDash val="sysDot"/>
               <a:tailEnd type="triangle"/>
             </a:ln>
           </p:spPr>
@@ -3578,88 +3865,41 @@
             </a:fontRef>
           </p:style>
         </p:cxnSp>
-        <p:cxnSp>
-          <p:nvCxnSpPr>
-            <p:cNvPr id="14" name="Straight Arrow Connector 13">
+        <p:sp>
+          <p:nvSpPr>
+            <p:cNvPr id="30" name="TextBox 29">
               <a:extLst>
                 <a:ext uri="{FF2B5EF4-FFF2-40B4-BE49-F238E27FC236}">
-                  <a16:creationId xmlns:a16="http://schemas.microsoft.com/office/drawing/2014/main" id="{3F1252B8-D036-6347-B4B2-84D599B3B11A}"/>
+                  <a16:creationId xmlns:a16="http://schemas.microsoft.com/office/drawing/2014/main" id="{464CF5EF-8F2D-C34F-AD57-6D0AB1E0FDF0}"/>
                 </a:ext>
               </a:extLst>
             </p:cNvPr>
-            <p:cNvCxnSpPr>
-              <a:cxnSpLocks/>
-            </p:cNvCxnSpPr>
+            <p:cNvSpPr txBox="1"/>
             <p:nvPr/>
-          </p:nvCxnSpPr>
+          </p:nvSpPr>
           <p:spPr>
-            <a:xfrm flipV="1">
-              <a:off x="3790750" y="3143450"/>
-              <a:ext cx="898359" cy="384209"/>
+            <a:xfrm>
+              <a:off x="5784698" y="5223126"/>
+              <a:ext cx="964303" cy="369332"/>
             </a:xfrm>
-            <a:prstGeom prst="straightConnector1">
+            <a:prstGeom prst="rect">
               <a:avLst/>
             </a:prstGeom>
-            <a:ln w="47625" cmpd="sng">
-              <a:tailEnd type="triangle"/>
-            </a:ln>
+            <a:noFill/>
           </p:spPr>
-          <p:style>
-            <a:lnRef idx="1">
-              <a:schemeClr val="accent1"/>
-            </a:lnRef>
-            <a:fillRef idx="0">
-              <a:schemeClr val="accent1"/>
-            </a:fillRef>
-            <a:effectRef idx="0">
-              <a:schemeClr val="accent1"/>
-            </a:effectRef>
-            <a:fontRef idx="minor">
-              <a:schemeClr val="tx1"/>
-            </a:fontRef>
-          </p:style>
-        </p:cxnSp>
-        <p:cxnSp>
-          <p:nvCxnSpPr>
-            <p:cNvPr id="16" name="Straight Arrow Connector 15">
-              <a:extLst>
-                <a:ext uri="{FF2B5EF4-FFF2-40B4-BE49-F238E27FC236}">
-                  <a16:creationId xmlns:a16="http://schemas.microsoft.com/office/drawing/2014/main" id="{08F2CCC1-71AE-074F-A156-621B75833944}"/>
-                </a:ext>
-              </a:extLst>
-            </p:cNvPr>
-            <p:cNvCxnSpPr>
-              <a:cxnSpLocks/>
-            </p:cNvCxnSpPr>
-            <p:nvPr/>
-          </p:nvCxnSpPr>
-          <p:spPr>
-            <a:xfrm flipH="1" flipV="1">
-              <a:off x="6235568" y="3143450"/>
-              <a:ext cx="898358" cy="384208"/>
-            </a:xfrm>
-            <a:prstGeom prst="straightConnector1">
-              <a:avLst/>
-            </a:prstGeom>
-            <a:ln w="47625" cmpd="sng">
-              <a:tailEnd type="triangle"/>
-            </a:ln>
-          </p:spPr>
-          <p:style>
-            <a:lnRef idx="1">
-              <a:schemeClr val="accent1"/>
-            </a:lnRef>
-            <a:fillRef idx="0">
-              <a:schemeClr val="accent1"/>
-            </a:fillRef>
-            <a:effectRef idx="0">
-              <a:schemeClr val="accent1"/>
-            </a:effectRef>
-            <a:fontRef idx="minor">
-              <a:schemeClr val="tx1"/>
-            </a:fontRef>
-          </p:style>
-        </p:cxnSp>
+          <p:txBody>
+            <a:bodyPr wrap="none" rtlCol="0">
+              <a:spAutoFit/>
+            </a:bodyPr>
+            <a:lstStyle/>
+            <a:p>
+              <a:r>
+                <a:rPr lang="en-US" dirty="0"/>
+                <a:t>optional</a:t>
+              </a:r>
+            </a:p>
+          </p:txBody>
+        </p:sp>
       </p:grpSp>
     </p:spTree>
     <p:extLst>

</xml_diff>

<commit_message>
about to change the api
</commit_message>
<xml_diff>
--- a/diagrams.pptx
+++ b/diagrams.pptx
@@ -3937,200 +3937,221 @@
           <a:chExt cx="0" cy="0"/>
         </a:xfrm>
       </p:grpSpPr>
-      <p:pic>
-        <p:nvPicPr>
-          <p:cNvPr id="6" name="Picture 5">
-            <a:extLst>
-              <a:ext uri="{FF2B5EF4-FFF2-40B4-BE49-F238E27FC236}">
-                <a16:creationId xmlns:a16="http://schemas.microsoft.com/office/drawing/2014/main" id="{FEAE1033-A59D-CA41-B00C-2C4526D14F27}"/>
-              </a:ext>
-            </a:extLst>
-          </p:cNvPr>
-          <p:cNvPicPr>
-            <a:picLocks noChangeAspect="1"/>
-          </p:cNvPicPr>
+      <p:grpSp>
+        <p:nvGrpSpPr>
+          <p:cNvPr id="16" name="Group 15">
+            <a:extLst>
+              <a:ext uri="{FF2B5EF4-FFF2-40B4-BE49-F238E27FC236}">
+                <a16:creationId xmlns:a16="http://schemas.microsoft.com/office/drawing/2014/main" id="{E40F5679-1FA1-1C4D-A869-56BF40DED790}"/>
+              </a:ext>
+            </a:extLst>
+          </p:cNvPr>
+          <p:cNvGrpSpPr/>
           <p:nvPr/>
-        </p:nvPicPr>
-        <p:blipFill>
-          <a:blip r:embed="rId2"/>
-          <a:stretch>
-            <a:fillRect/>
-          </a:stretch>
-        </p:blipFill>
-        <p:spPr>
+        </p:nvGrpSpPr>
+        <p:grpSpPr>
           <a:xfrm>
             <a:off x="1310640" y="162572"/>
             <a:ext cx="9558984" cy="6695427"/>
+            <a:chOff x="1310640" y="162572"/>
+            <a:chExt cx="9558984" cy="6695427"/>
           </a:xfrm>
-          <a:prstGeom prst="rect">
-            <a:avLst/>
-          </a:prstGeom>
-        </p:spPr>
-      </p:pic>
-      <p:cxnSp>
-        <p:nvCxnSpPr>
-          <p:cNvPr id="8" name="Straight Connector 7">
-            <a:extLst>
-              <a:ext uri="{FF2B5EF4-FFF2-40B4-BE49-F238E27FC236}">
-                <a16:creationId xmlns:a16="http://schemas.microsoft.com/office/drawing/2014/main" id="{5109B527-37F6-B94F-84E2-360DB44DDD77}"/>
-              </a:ext>
-            </a:extLst>
-          </p:cNvPr>
-          <p:cNvCxnSpPr>
-            <a:cxnSpLocks/>
-          </p:cNvCxnSpPr>
-          <p:nvPr/>
-        </p:nvCxnSpPr>
-        <p:spPr>
-          <a:xfrm>
-            <a:off x="2050181" y="3322320"/>
-            <a:ext cx="8546699" cy="0"/>
-          </a:xfrm>
-          <a:prstGeom prst="line">
-            <a:avLst/>
-          </a:prstGeom>
-          <a:ln w="34925">
-            <a:solidFill>
+        </p:grpSpPr>
+        <p:pic>
+          <p:nvPicPr>
+            <p:cNvPr id="6" name="Picture 5">
+              <a:extLst>
+                <a:ext uri="{FF2B5EF4-FFF2-40B4-BE49-F238E27FC236}">
+                  <a16:creationId xmlns:a16="http://schemas.microsoft.com/office/drawing/2014/main" id="{FEAE1033-A59D-CA41-B00C-2C4526D14F27}"/>
+                </a:ext>
+              </a:extLst>
+            </p:cNvPr>
+            <p:cNvPicPr>
+              <a:picLocks noChangeAspect="1"/>
+            </p:cNvPicPr>
+            <p:nvPr/>
+          </p:nvPicPr>
+          <p:blipFill>
+            <a:blip r:embed="rId2"/>
+            <a:stretch>
+              <a:fillRect/>
+            </a:stretch>
+          </p:blipFill>
+          <p:spPr>
+            <a:xfrm>
+              <a:off x="1310640" y="162572"/>
+              <a:ext cx="9558984" cy="6695427"/>
+            </a:xfrm>
+            <a:prstGeom prst="rect">
+              <a:avLst/>
+            </a:prstGeom>
+          </p:spPr>
+        </p:pic>
+        <p:cxnSp>
+          <p:nvCxnSpPr>
+            <p:cNvPr id="8" name="Straight Connector 7">
+              <a:extLst>
+                <a:ext uri="{FF2B5EF4-FFF2-40B4-BE49-F238E27FC236}">
+                  <a16:creationId xmlns:a16="http://schemas.microsoft.com/office/drawing/2014/main" id="{5109B527-37F6-B94F-84E2-360DB44DDD77}"/>
+                </a:ext>
+              </a:extLst>
+            </p:cNvPr>
+            <p:cNvCxnSpPr>
+              <a:cxnSpLocks/>
+            </p:cNvCxnSpPr>
+            <p:nvPr/>
+          </p:nvCxnSpPr>
+          <p:spPr>
+            <a:xfrm>
+              <a:off x="2050181" y="3322320"/>
+              <a:ext cx="8546699" cy="0"/>
+            </a:xfrm>
+            <a:prstGeom prst="line">
+              <a:avLst/>
+            </a:prstGeom>
+            <a:ln w="34925">
+              <a:solidFill>
+                <a:schemeClr val="tx1"/>
+              </a:solidFill>
+              <a:prstDash val="sysDash"/>
+            </a:ln>
+          </p:spPr>
+          <p:style>
+            <a:lnRef idx="1">
+              <a:schemeClr val="accent1"/>
+            </a:lnRef>
+            <a:fillRef idx="0">
+              <a:schemeClr val="accent1"/>
+            </a:fillRef>
+            <a:effectRef idx="0">
+              <a:schemeClr val="accent1"/>
+            </a:effectRef>
+            <a:fontRef idx="minor">
               <a:schemeClr val="tx1"/>
-            </a:solidFill>
-            <a:prstDash val="sysDash"/>
-          </a:ln>
-        </p:spPr>
-        <p:style>
-          <a:lnRef idx="1">
-            <a:schemeClr val="accent1"/>
-          </a:lnRef>
-          <a:fillRef idx="0">
-            <a:schemeClr val="accent1"/>
-          </a:fillRef>
-          <a:effectRef idx="0">
-            <a:schemeClr val="accent1"/>
-          </a:effectRef>
-          <a:fontRef idx="minor">
-            <a:schemeClr val="tx1"/>
-          </a:fontRef>
-        </p:style>
-      </p:cxnSp>
-      <p:sp>
-        <p:nvSpPr>
-          <p:cNvPr id="11" name="TextBox 10">
-            <a:extLst>
-              <a:ext uri="{FF2B5EF4-FFF2-40B4-BE49-F238E27FC236}">
-                <a16:creationId xmlns:a16="http://schemas.microsoft.com/office/drawing/2014/main" id="{ABA54264-A2B9-FD47-9DD3-CD15455A7468}"/>
-              </a:ext>
-            </a:extLst>
-          </p:cNvPr>
-          <p:cNvSpPr txBox="1"/>
-          <p:nvPr/>
-        </p:nvSpPr>
-        <p:spPr>
-          <a:xfrm>
-            <a:off x="7543012" y="882134"/>
-            <a:ext cx="1463040" cy="369332"/>
-          </a:xfrm>
-          <a:prstGeom prst="rect">
-            <a:avLst/>
-          </a:prstGeom>
-          <a:noFill/>
-        </p:spPr>
-        <p:txBody>
-          <a:bodyPr wrap="square" rtlCol="0">
-            <a:spAutoFit/>
-          </a:bodyPr>
-          <a:lstStyle/>
-          <a:p>
-            <a:pPr algn="ctr"/>
-            <a:r>
-              <a:rPr lang="en-US" dirty="0">
-                <a:latin typeface="Gill Sans MT" panose="020B0502020104020203" pitchFamily="34" charset="77"/>
-              </a:rPr>
-              <a:t>max value</a:t>
-            </a:r>
-          </a:p>
-        </p:txBody>
-      </p:sp>
-      <p:cxnSp>
-        <p:nvCxnSpPr>
-          <p:cNvPr id="13" name="Straight Arrow Connector 12">
-            <a:extLst>
-              <a:ext uri="{FF2B5EF4-FFF2-40B4-BE49-F238E27FC236}">
-                <a16:creationId xmlns:a16="http://schemas.microsoft.com/office/drawing/2014/main" id="{9FBD8306-7C40-3642-9A45-82FC5C115E0C}"/>
-              </a:ext>
-            </a:extLst>
-          </p:cNvPr>
-          <p:cNvCxnSpPr>
-            <a:cxnSpLocks/>
-          </p:cNvCxnSpPr>
-          <p:nvPr/>
-        </p:nvCxnSpPr>
-        <p:spPr>
-          <a:xfrm flipH="1">
-            <a:off x="6807200" y="1087120"/>
-            <a:ext cx="955040" cy="0"/>
-          </a:xfrm>
-          <a:prstGeom prst="straightConnector1">
-            <a:avLst/>
-          </a:prstGeom>
-          <a:ln w="44450">
-            <a:solidFill>
+            </a:fontRef>
+          </p:style>
+        </p:cxnSp>
+        <p:sp>
+          <p:nvSpPr>
+            <p:cNvPr id="11" name="TextBox 10">
+              <a:extLst>
+                <a:ext uri="{FF2B5EF4-FFF2-40B4-BE49-F238E27FC236}">
+                  <a16:creationId xmlns:a16="http://schemas.microsoft.com/office/drawing/2014/main" id="{ABA54264-A2B9-FD47-9DD3-CD15455A7468}"/>
+                </a:ext>
+              </a:extLst>
+            </p:cNvPr>
+            <p:cNvSpPr txBox="1"/>
+            <p:nvPr/>
+          </p:nvSpPr>
+          <p:spPr>
+            <a:xfrm>
+              <a:off x="7543012" y="882134"/>
+              <a:ext cx="1463040" cy="369332"/>
+            </a:xfrm>
+            <a:prstGeom prst="rect">
+              <a:avLst/>
+            </a:prstGeom>
+            <a:noFill/>
+          </p:spPr>
+          <p:txBody>
+            <a:bodyPr wrap="square" rtlCol="0">
+              <a:spAutoFit/>
+            </a:bodyPr>
+            <a:lstStyle/>
+            <a:p>
+              <a:pPr algn="ctr"/>
+              <a:r>
+                <a:rPr lang="en-US" dirty="0">
+                  <a:latin typeface="Gill Sans MT" panose="020B0502020104020203" pitchFamily="34" charset="77"/>
+                </a:rPr>
+                <a:t>max value</a:t>
+              </a:r>
+            </a:p>
+          </p:txBody>
+        </p:sp>
+        <p:cxnSp>
+          <p:nvCxnSpPr>
+            <p:cNvPr id="13" name="Straight Arrow Connector 12">
+              <a:extLst>
+                <a:ext uri="{FF2B5EF4-FFF2-40B4-BE49-F238E27FC236}">
+                  <a16:creationId xmlns:a16="http://schemas.microsoft.com/office/drawing/2014/main" id="{9FBD8306-7C40-3642-9A45-82FC5C115E0C}"/>
+                </a:ext>
+              </a:extLst>
+            </p:cNvPr>
+            <p:cNvCxnSpPr>
+              <a:cxnSpLocks/>
+            </p:cNvCxnSpPr>
+            <p:nvPr/>
+          </p:nvCxnSpPr>
+          <p:spPr>
+            <a:xfrm flipH="1">
+              <a:off x="6807200" y="1087120"/>
+              <a:ext cx="955040" cy="0"/>
+            </a:xfrm>
+            <a:prstGeom prst="straightConnector1">
+              <a:avLst/>
+            </a:prstGeom>
+            <a:ln w="44450">
+              <a:solidFill>
+                <a:schemeClr val="tx1"/>
+              </a:solidFill>
+              <a:tailEnd type="triangle"/>
+            </a:ln>
+          </p:spPr>
+          <p:style>
+            <a:lnRef idx="1">
+              <a:schemeClr val="accent1"/>
+            </a:lnRef>
+            <a:fillRef idx="0">
+              <a:schemeClr val="accent1"/>
+            </a:fillRef>
+            <a:effectRef idx="0">
+              <a:schemeClr val="accent1"/>
+            </a:effectRef>
+            <a:fontRef idx="minor">
               <a:schemeClr val="tx1"/>
-            </a:solidFill>
-            <a:tailEnd type="triangle"/>
-          </a:ln>
-        </p:spPr>
-        <p:style>
-          <a:lnRef idx="1">
-            <a:schemeClr val="accent1"/>
-          </a:lnRef>
-          <a:fillRef idx="0">
-            <a:schemeClr val="accent1"/>
-          </a:fillRef>
-          <a:effectRef idx="0">
-            <a:schemeClr val="accent1"/>
-          </a:effectRef>
-          <a:fontRef idx="minor">
-            <a:schemeClr val="tx1"/>
-          </a:fontRef>
-        </p:style>
-      </p:cxnSp>
-      <p:sp>
-        <p:nvSpPr>
-          <p:cNvPr id="15" name="TextBox 14">
-            <a:extLst>
-              <a:ext uri="{FF2B5EF4-FFF2-40B4-BE49-F238E27FC236}">
-                <a16:creationId xmlns:a16="http://schemas.microsoft.com/office/drawing/2014/main" id="{D6149370-092C-D740-A98E-166E52DF0ED5}"/>
-              </a:ext>
-            </a:extLst>
-          </p:cNvPr>
-          <p:cNvSpPr txBox="1"/>
-          <p:nvPr/>
-        </p:nvSpPr>
-        <p:spPr>
-          <a:xfrm>
-            <a:off x="3214852" y="2993628"/>
-            <a:ext cx="2667788" cy="369332"/>
-          </a:xfrm>
-          <a:prstGeom prst="rect">
-            <a:avLst/>
-          </a:prstGeom>
-          <a:noFill/>
-        </p:spPr>
-        <p:txBody>
-          <a:bodyPr wrap="square" rtlCol="0">
-            <a:spAutoFit/>
-          </a:bodyPr>
-          <a:lstStyle/>
-          <a:p>
-            <a:pPr algn="ctr"/>
-            <a:r>
-              <a:rPr lang="en-US" dirty="0">
-                <a:latin typeface="Gill Sans MT" panose="020B0502020104020203" pitchFamily="34" charset="77"/>
-              </a:rPr>
-              <a:t>threshold value</a:t>
-            </a:r>
-          </a:p>
-        </p:txBody>
-      </p:sp>
+            </a:fontRef>
+          </p:style>
+        </p:cxnSp>
+        <p:sp>
+          <p:nvSpPr>
+            <p:cNvPr id="15" name="TextBox 14">
+              <a:extLst>
+                <a:ext uri="{FF2B5EF4-FFF2-40B4-BE49-F238E27FC236}">
+                  <a16:creationId xmlns:a16="http://schemas.microsoft.com/office/drawing/2014/main" id="{D6149370-092C-D740-A98E-166E52DF0ED5}"/>
+                </a:ext>
+              </a:extLst>
+            </p:cNvPr>
+            <p:cNvSpPr txBox="1"/>
+            <p:nvPr/>
+          </p:nvSpPr>
+          <p:spPr>
+            <a:xfrm>
+              <a:off x="3214852" y="2993628"/>
+              <a:ext cx="2667788" cy="369332"/>
+            </a:xfrm>
+            <a:prstGeom prst="rect">
+              <a:avLst/>
+            </a:prstGeom>
+            <a:noFill/>
+          </p:spPr>
+          <p:txBody>
+            <a:bodyPr wrap="square" rtlCol="0">
+              <a:spAutoFit/>
+            </a:bodyPr>
+            <a:lstStyle/>
+            <a:p>
+              <a:pPr algn="ctr"/>
+              <a:r>
+                <a:rPr lang="en-US" dirty="0">
+                  <a:latin typeface="Gill Sans MT" panose="020B0502020104020203" pitchFamily="34" charset="77"/>
+                </a:rPr>
+                <a:t>threshold value</a:t>
+              </a:r>
+            </a:p>
+          </p:txBody>
+        </p:sp>
+      </p:grpSp>
     </p:spTree>
     <p:extLst>
       <p:ext uri="{BB962C8B-B14F-4D97-AF65-F5344CB8AC3E}">

</xml_diff>